<commit_message>
story / Final Presentation
</commit_message>
<xml_diff>
--- a/FinalProject_SANet/demo/presentation.pptx
+++ b/FinalProject_SANet/demo/presentation.pptx
@@ -5,34 +5,35 @@
     <p:sldMasterId id="2147483657" r:id="rId1"/>
   </p:sldMasterIdLst>
   <p:notesMasterIdLst>
-    <p:notesMasterId r:id="rId12"/>
+    <p:notesMasterId r:id="rId13"/>
   </p:notesMasterIdLst>
   <p:sldIdLst>
     <p:sldId id="256" r:id="rId2"/>
     <p:sldId id="257" r:id="rId3"/>
-    <p:sldId id="258" r:id="rId4"/>
-    <p:sldId id="285" r:id="rId5"/>
-    <p:sldId id="259" r:id="rId6"/>
-    <p:sldId id="286" r:id="rId7"/>
-    <p:sldId id="287" r:id="rId8"/>
-    <p:sldId id="288" r:id="rId9"/>
-    <p:sldId id="289" r:id="rId10"/>
-    <p:sldId id="279" r:id="rId11"/>
+    <p:sldId id="290" r:id="rId4"/>
+    <p:sldId id="258" r:id="rId5"/>
+    <p:sldId id="285" r:id="rId6"/>
+    <p:sldId id="259" r:id="rId7"/>
+    <p:sldId id="286" r:id="rId8"/>
+    <p:sldId id="287" r:id="rId9"/>
+    <p:sldId id="288" r:id="rId10"/>
+    <p:sldId id="289" r:id="rId11"/>
+    <p:sldId id="279" r:id="rId12"/>
   </p:sldIdLst>
   <p:sldSz cx="9144000" cy="5143500" type="screen16x9"/>
   <p:notesSz cx="6858000" cy="9144000"/>
   <p:embeddedFontLst>
     <p:embeddedFont>
       <p:font typeface="Cambria Math" panose="02040503050406030204" pitchFamily="18" charset="0"/>
-      <p:regular r:id="rId13"/>
+      <p:regular r:id="rId14"/>
     </p:embeddedFont>
     <p:embeddedFont>
       <p:font typeface="Sniglet" panose="020B0604020202020204" charset="0"/>
-      <p:regular r:id="rId14"/>
+      <p:regular r:id="rId15"/>
     </p:embeddedFont>
     <p:embeddedFont>
       <p:font typeface="Walter Turncoat" panose="020B0604020202020204" charset="0"/>
-      <p:regular r:id="rId15"/>
+      <p:regular r:id="rId16"/>
     </p:embeddedFont>
   </p:embeddedFontLst>
   <p:defaultTextStyle>
@@ -264,6 +265,11 @@
       </a:defRPr>
     </a:lvl9pPr>
   </p:defaultTextStyle>
+  <p:extLst>
+    <p:ext uri="{EFAFB233-063F-42B5-8137-9DF3F51BA10A}">
+      <p15:sldGuideLst xmlns:p15="http://schemas.microsoft.com/office/powerpoint/2012/main"/>
+    </p:ext>
+  </p:extLst>
 </p:presentation>
 </file>
 
@@ -815,6 +821,115 @@
   <p:cSld>
     <p:spTree>
       <p:nvGrpSpPr>
+        <p:cNvPr id="1" name="Shape 77"/>
+        <p:cNvGrpSpPr/>
+        <p:nvPr/>
+      </p:nvGrpSpPr>
+      <p:grpSpPr>
+        <a:xfrm>
+          <a:off x="0" y="0"/>
+          <a:ext cx="0" cy="0"/>
+          <a:chOff x="0" y="0"/>
+          <a:chExt cx="0" cy="0"/>
+        </a:xfrm>
+      </p:grpSpPr>
+      <p:sp>
+        <p:nvSpPr>
+          <p:cNvPr id="78" name="Google Shape;78;g35f391192_029:notes"/>
+          <p:cNvSpPr>
+            <a:spLocks noGrp="1" noRot="1" noChangeAspect="1"/>
+          </p:cNvSpPr>
+          <p:nvPr>
+            <p:ph type="sldImg" idx="2"/>
+          </p:nvPr>
+        </p:nvSpPr>
+        <p:spPr>
+          <a:xfrm>
+            <a:off x="381000" y="685800"/>
+            <a:ext cx="6096000" cy="3429000"/>
+          </a:xfrm>
+          <a:custGeom>
+            <a:avLst/>
+            <a:gdLst/>
+            <a:ahLst/>
+            <a:cxnLst/>
+            <a:rect l="l" t="t" r="r" b="b"/>
+            <a:pathLst>
+              <a:path w="120000" h="120000" extrusionOk="0">
+                <a:moveTo>
+                  <a:pt x="0" y="0"/>
+                </a:moveTo>
+                <a:lnTo>
+                  <a:pt x="120000" y="0"/>
+                </a:lnTo>
+                <a:lnTo>
+                  <a:pt x="120000" y="120000"/>
+                </a:lnTo>
+                <a:lnTo>
+                  <a:pt x="0" y="120000"/>
+                </a:lnTo>
+                <a:close/>
+              </a:path>
+            </a:pathLst>
+          </a:custGeom>
+        </p:spPr>
+      </p:sp>
+      <p:sp>
+        <p:nvSpPr>
+          <p:cNvPr id="79" name="Google Shape;79;g35f391192_029:notes"/>
+          <p:cNvSpPr txBox="1">
+            <a:spLocks noGrp="1"/>
+          </p:cNvSpPr>
+          <p:nvPr>
+            <p:ph type="body" idx="1"/>
+          </p:nvPr>
+        </p:nvSpPr>
+        <p:spPr>
+          <a:xfrm>
+            <a:off x="685800" y="4343400"/>
+            <a:ext cx="5486400" cy="4114800"/>
+          </a:xfrm>
+          <a:prstGeom prst="rect">
+            <a:avLst/>
+          </a:prstGeom>
+        </p:spPr>
+        <p:txBody>
+          <a:bodyPr spcFirstLastPara="1" wrap="square" lIns="91425" tIns="91425" rIns="91425" bIns="91425" anchor="t" anchorCtr="0">
+            <a:noAutofit/>
+          </a:bodyPr>
+          <a:lstStyle/>
+          <a:p>
+            <a:pPr marL="0" lvl="0" indent="0" algn="l" rtl="0">
+              <a:spcBef>
+                <a:spcPts val="0"/>
+              </a:spcBef>
+              <a:spcAft>
+                <a:spcPts val="0"/>
+              </a:spcAft>
+              <a:buNone/>
+            </a:pPr>
+            <a:endParaRPr/>
+          </a:p>
+        </p:txBody>
+      </p:sp>
+    </p:spTree>
+    <p:extLst>
+      <p:ext uri="{BB962C8B-B14F-4D97-AF65-F5344CB8AC3E}">
+        <p14:creationId xmlns:p14="http://schemas.microsoft.com/office/powerpoint/2010/main" val="4167300879"/>
+      </p:ext>
+    </p:extLst>
+  </p:cSld>
+  <p:clrMapOvr>
+    <a:masterClrMapping/>
+  </p:clrMapOvr>
+</p:notes>
+</file>
+
+<file path=ppt/notesSlides/notesSlide11.xml><?xml version="1.0" encoding="utf-8"?>
+<p:notes xmlns:a="http://schemas.openxmlformats.org/drawingml/2006/main" xmlns:r="http://schemas.openxmlformats.org/officeDocument/2006/relationships" xmlns:p="http://schemas.openxmlformats.org/presentationml/2006/main" showMasterSp="0" showMasterPhAnim="0">
+  <p:cSld>
+    <p:spTree>
+      <p:nvGrpSpPr>
         <p:cNvPr id="1" name="Shape 293"/>
         <p:cNvGrpSpPr/>
         <p:nvPr/>
@@ -1023,6 +1138,115 @@
   <p:cSld>
     <p:spTree>
       <p:nvGrpSpPr>
+        <p:cNvPr id="1" name="Shape 57"/>
+        <p:cNvGrpSpPr/>
+        <p:nvPr/>
+      </p:nvGrpSpPr>
+      <p:grpSpPr>
+        <a:xfrm>
+          <a:off x="0" y="0"/>
+          <a:ext cx="0" cy="0"/>
+          <a:chOff x="0" y="0"/>
+          <a:chExt cx="0" cy="0"/>
+        </a:xfrm>
+      </p:grpSpPr>
+      <p:sp>
+        <p:nvSpPr>
+          <p:cNvPr id="58" name="Google Shape;58;g3606f1c2d_30:notes"/>
+          <p:cNvSpPr>
+            <a:spLocks noGrp="1" noRot="1" noChangeAspect="1"/>
+          </p:cNvSpPr>
+          <p:nvPr>
+            <p:ph type="sldImg" idx="2"/>
+          </p:nvPr>
+        </p:nvSpPr>
+        <p:spPr>
+          <a:xfrm>
+            <a:off x="381000" y="685800"/>
+            <a:ext cx="6096000" cy="3429000"/>
+          </a:xfrm>
+          <a:custGeom>
+            <a:avLst/>
+            <a:gdLst/>
+            <a:ahLst/>
+            <a:cxnLst/>
+            <a:rect l="l" t="t" r="r" b="b"/>
+            <a:pathLst>
+              <a:path w="120000" h="120000" extrusionOk="0">
+                <a:moveTo>
+                  <a:pt x="0" y="0"/>
+                </a:moveTo>
+                <a:lnTo>
+                  <a:pt x="120000" y="0"/>
+                </a:lnTo>
+                <a:lnTo>
+                  <a:pt x="120000" y="120000"/>
+                </a:lnTo>
+                <a:lnTo>
+                  <a:pt x="0" y="120000"/>
+                </a:lnTo>
+                <a:close/>
+              </a:path>
+            </a:pathLst>
+          </a:custGeom>
+        </p:spPr>
+      </p:sp>
+      <p:sp>
+        <p:nvSpPr>
+          <p:cNvPr id="59" name="Google Shape;59;g3606f1c2d_30:notes"/>
+          <p:cNvSpPr txBox="1">
+            <a:spLocks noGrp="1"/>
+          </p:cNvSpPr>
+          <p:nvPr>
+            <p:ph type="body" idx="1"/>
+          </p:nvPr>
+        </p:nvSpPr>
+        <p:spPr>
+          <a:xfrm>
+            <a:off x="685800" y="4343400"/>
+            <a:ext cx="5486400" cy="4114800"/>
+          </a:xfrm>
+          <a:prstGeom prst="rect">
+            <a:avLst/>
+          </a:prstGeom>
+        </p:spPr>
+        <p:txBody>
+          <a:bodyPr spcFirstLastPara="1" wrap="square" lIns="91425" tIns="91425" rIns="91425" bIns="91425" anchor="t" anchorCtr="0">
+            <a:noAutofit/>
+          </a:bodyPr>
+          <a:lstStyle/>
+          <a:p>
+            <a:pPr marL="0" lvl="0" indent="0" algn="l" rtl="0">
+              <a:spcBef>
+                <a:spcPts val="0"/>
+              </a:spcBef>
+              <a:spcAft>
+                <a:spcPts val="0"/>
+              </a:spcAft>
+              <a:buNone/>
+            </a:pPr>
+            <a:endParaRPr/>
+          </a:p>
+        </p:txBody>
+      </p:sp>
+    </p:spTree>
+    <p:extLst>
+      <p:ext uri="{BB962C8B-B14F-4D97-AF65-F5344CB8AC3E}">
+        <p14:creationId xmlns:p14="http://schemas.microsoft.com/office/powerpoint/2010/main" val="2280118983"/>
+      </p:ext>
+    </p:extLst>
+  </p:cSld>
+  <p:clrMapOvr>
+    <a:masterClrMapping/>
+  </p:clrMapOvr>
+</p:notes>
+</file>
+
+<file path=ppt/notesSlides/notesSlide4.xml><?xml version="1.0" encoding="utf-8"?>
+<p:notes xmlns:a="http://schemas.openxmlformats.org/drawingml/2006/main" xmlns:r="http://schemas.openxmlformats.org/officeDocument/2006/relationships" xmlns:p="http://schemas.openxmlformats.org/presentationml/2006/main" showMasterSp="0" showMasterPhAnim="0">
+  <p:cSld>
+    <p:spTree>
+      <p:nvGrpSpPr>
         <p:cNvPr id="1" name="Shape 68"/>
         <p:cNvGrpSpPr/>
         <p:nvPr/>
@@ -1115,115 +1339,6 @@
         </p:txBody>
       </p:sp>
     </p:spTree>
-  </p:cSld>
-  <p:clrMapOvr>
-    <a:masterClrMapping/>
-  </p:clrMapOvr>
-</p:notes>
-</file>
-
-<file path=ppt/notesSlides/notesSlide4.xml><?xml version="1.0" encoding="utf-8"?>
-<p:notes xmlns:a="http://schemas.openxmlformats.org/drawingml/2006/main" xmlns:r="http://schemas.openxmlformats.org/officeDocument/2006/relationships" xmlns:p="http://schemas.openxmlformats.org/presentationml/2006/main" showMasterSp="0" showMasterPhAnim="0">
-  <p:cSld>
-    <p:spTree>
-      <p:nvGrpSpPr>
-        <p:cNvPr id="1" name="Shape 77"/>
-        <p:cNvGrpSpPr/>
-        <p:nvPr/>
-      </p:nvGrpSpPr>
-      <p:grpSpPr>
-        <a:xfrm>
-          <a:off x="0" y="0"/>
-          <a:ext cx="0" cy="0"/>
-          <a:chOff x="0" y="0"/>
-          <a:chExt cx="0" cy="0"/>
-        </a:xfrm>
-      </p:grpSpPr>
-      <p:sp>
-        <p:nvSpPr>
-          <p:cNvPr id="78" name="Google Shape;78;g35f391192_029:notes"/>
-          <p:cNvSpPr>
-            <a:spLocks noGrp="1" noRot="1" noChangeAspect="1"/>
-          </p:cNvSpPr>
-          <p:nvPr>
-            <p:ph type="sldImg" idx="2"/>
-          </p:nvPr>
-        </p:nvSpPr>
-        <p:spPr>
-          <a:xfrm>
-            <a:off x="381000" y="685800"/>
-            <a:ext cx="6096000" cy="3429000"/>
-          </a:xfrm>
-          <a:custGeom>
-            <a:avLst/>
-            <a:gdLst/>
-            <a:ahLst/>
-            <a:cxnLst/>
-            <a:rect l="l" t="t" r="r" b="b"/>
-            <a:pathLst>
-              <a:path w="120000" h="120000" extrusionOk="0">
-                <a:moveTo>
-                  <a:pt x="0" y="0"/>
-                </a:moveTo>
-                <a:lnTo>
-                  <a:pt x="120000" y="0"/>
-                </a:lnTo>
-                <a:lnTo>
-                  <a:pt x="120000" y="120000"/>
-                </a:lnTo>
-                <a:lnTo>
-                  <a:pt x="0" y="120000"/>
-                </a:lnTo>
-                <a:close/>
-              </a:path>
-            </a:pathLst>
-          </a:custGeom>
-        </p:spPr>
-      </p:sp>
-      <p:sp>
-        <p:nvSpPr>
-          <p:cNvPr id="79" name="Google Shape;79;g35f391192_029:notes"/>
-          <p:cNvSpPr txBox="1">
-            <a:spLocks noGrp="1"/>
-          </p:cNvSpPr>
-          <p:nvPr>
-            <p:ph type="body" idx="1"/>
-          </p:nvPr>
-        </p:nvSpPr>
-        <p:spPr>
-          <a:xfrm>
-            <a:off x="685800" y="4343400"/>
-            <a:ext cx="5486400" cy="4114800"/>
-          </a:xfrm>
-          <a:prstGeom prst="rect">
-            <a:avLst/>
-          </a:prstGeom>
-        </p:spPr>
-        <p:txBody>
-          <a:bodyPr spcFirstLastPara="1" wrap="square" lIns="91425" tIns="91425" rIns="91425" bIns="91425" anchor="t" anchorCtr="0">
-            <a:noAutofit/>
-          </a:bodyPr>
-          <a:lstStyle/>
-          <a:p>
-            <a:pPr marL="0" lvl="0" indent="0" algn="l" rtl="0">
-              <a:spcBef>
-                <a:spcPts val="0"/>
-              </a:spcBef>
-              <a:spcAft>
-                <a:spcPts val="0"/>
-              </a:spcAft>
-              <a:buNone/>
-            </a:pPr>
-            <a:endParaRPr/>
-          </a:p>
-        </p:txBody>
-      </p:sp>
-    </p:spTree>
-    <p:extLst>
-      <p:ext uri="{BB962C8B-B14F-4D97-AF65-F5344CB8AC3E}">
-        <p14:creationId xmlns:p14="http://schemas.microsoft.com/office/powerpoint/2010/main" val="2554573224"/>
-      </p:ext>
-    </p:extLst>
   </p:cSld>
   <p:clrMapOvr>
     <a:masterClrMapping/>
@@ -1328,6 +1443,11 @@
         </p:txBody>
       </p:sp>
     </p:spTree>
+    <p:extLst>
+      <p:ext uri="{BB962C8B-B14F-4D97-AF65-F5344CB8AC3E}">
+        <p14:creationId xmlns:p14="http://schemas.microsoft.com/office/powerpoint/2010/main" val="2554573224"/>
+      </p:ext>
+    </p:extLst>
   </p:cSld>
   <p:clrMapOvr>
     <a:masterClrMapping/>
@@ -1432,11 +1552,6 @@
         </p:txBody>
       </p:sp>
     </p:spTree>
-    <p:extLst>
-      <p:ext uri="{BB962C8B-B14F-4D97-AF65-F5344CB8AC3E}">
-        <p14:creationId xmlns:p14="http://schemas.microsoft.com/office/powerpoint/2010/main" val="2268899615"/>
-      </p:ext>
-    </p:extLst>
   </p:cSld>
   <p:clrMapOvr>
     <a:masterClrMapping/>
@@ -1543,7 +1658,7 @@
     </p:spTree>
     <p:extLst>
       <p:ext uri="{BB962C8B-B14F-4D97-AF65-F5344CB8AC3E}">
-        <p14:creationId xmlns:p14="http://schemas.microsoft.com/office/powerpoint/2010/main" val="3111186941"/>
+        <p14:creationId xmlns:p14="http://schemas.microsoft.com/office/powerpoint/2010/main" val="2268899615"/>
       </p:ext>
     </p:extLst>
   </p:cSld>
@@ -1652,7 +1767,7 @@
     </p:spTree>
     <p:extLst>
       <p:ext uri="{BB962C8B-B14F-4D97-AF65-F5344CB8AC3E}">
-        <p14:creationId xmlns:p14="http://schemas.microsoft.com/office/powerpoint/2010/main" val="3529032806"/>
+        <p14:creationId xmlns:p14="http://schemas.microsoft.com/office/powerpoint/2010/main" val="3111186941"/>
       </p:ext>
     </p:extLst>
   </p:cSld>
@@ -1761,7 +1876,7 @@
     </p:spTree>
     <p:extLst>
       <p:ext uri="{BB962C8B-B14F-4D97-AF65-F5344CB8AC3E}">
-        <p14:creationId xmlns:p14="http://schemas.microsoft.com/office/powerpoint/2010/main" val="4167300879"/>
+        <p14:creationId xmlns:p14="http://schemas.microsoft.com/office/powerpoint/2010/main" val="3529032806"/>
       </p:ext>
     </p:extLst>
   </p:cSld>
@@ -7002,6 +7117,122 @@
   <p:cSld>
     <p:spTree>
       <p:nvGrpSpPr>
+        <p:cNvPr id="1" name="Shape 80"/>
+        <p:cNvGrpSpPr/>
+        <p:nvPr/>
+      </p:nvGrpSpPr>
+      <p:grpSpPr>
+        <a:xfrm>
+          <a:off x="0" y="0"/>
+          <a:ext cx="0" cy="0"/>
+          <a:chOff x="0" y="0"/>
+          <a:chExt cx="0" cy="0"/>
+        </a:xfrm>
+      </p:grpSpPr>
+      <p:pic>
+        <p:nvPicPr>
+          <p:cNvPr id="6" name="Picture 5">
+            <a:extLst>
+              <a:ext uri="{FF2B5EF4-FFF2-40B4-BE49-F238E27FC236}">
+                <a16:creationId xmlns:a16="http://schemas.microsoft.com/office/drawing/2014/main" id="{6232964A-FBA8-4F56-A45A-05A103F1076E}"/>
+              </a:ext>
+            </a:extLst>
+          </p:cNvPr>
+          <p:cNvPicPr>
+            <a:picLocks noChangeAspect="1"/>
+          </p:cNvPicPr>
+          <p:nvPr/>
+        </p:nvPicPr>
+        <p:blipFill>
+          <a:blip r:embed="rId3"/>
+          <a:stretch>
+            <a:fillRect/>
+          </a:stretch>
+        </p:blipFill>
+        <p:spPr>
+          <a:xfrm>
+            <a:off x="0" y="-14177"/>
+            <a:ext cx="9144000" cy="5143501"/>
+          </a:xfrm>
+          <a:prstGeom prst="rect">
+            <a:avLst/>
+          </a:prstGeom>
+        </p:spPr>
+      </p:pic>
+      <p:sp>
+        <p:nvSpPr>
+          <p:cNvPr id="11" name="Google Shape;84;p14">
+            <a:extLst>
+              <a:ext uri="{FF2B5EF4-FFF2-40B4-BE49-F238E27FC236}">
+                <a16:creationId xmlns:a16="http://schemas.microsoft.com/office/drawing/2014/main" id="{40B07FC3-68E7-4681-9111-817FEF02ED58}"/>
+              </a:ext>
+            </a:extLst>
+          </p:cNvPr>
+          <p:cNvSpPr txBox="1">
+            <a:spLocks noGrp="1"/>
+          </p:cNvSpPr>
+          <p:nvPr>
+            <p:ph type="sldNum" idx="12"/>
+          </p:nvPr>
+        </p:nvSpPr>
+        <p:spPr>
+          <a:xfrm>
+            <a:off x="4297650" y="4832975"/>
+            <a:ext cx="548700" cy="310500"/>
+          </a:xfrm>
+          <a:prstGeom prst="rect">
+            <a:avLst/>
+          </a:prstGeom>
+        </p:spPr>
+        <p:txBody>
+          <a:bodyPr spcFirstLastPara="1" wrap="square" lIns="91425" tIns="91425" rIns="91425" bIns="91425" anchor="t" anchorCtr="0">
+            <a:noAutofit/>
+          </a:bodyPr>
+          <a:lstStyle/>
+          <a:p>
+            <a:pPr marL="0" lvl="0" indent="0" algn="ctr" rtl="0">
+              <a:spcBef>
+                <a:spcPts val="0"/>
+              </a:spcBef>
+              <a:spcAft>
+                <a:spcPts val="0"/>
+              </a:spcAft>
+              <a:buNone/>
+            </a:pPr>
+            <a:fld id="{00000000-1234-1234-1234-123412341234}" type="slidenum">
+              <a:rPr lang="en">
+                <a:solidFill>
+                  <a:schemeClr val="tx1"/>
+                </a:solidFill>
+              </a:rPr>
+              <a:t>10</a:t>
+            </a:fld>
+            <a:endParaRPr dirty="0">
+              <a:solidFill>
+                <a:schemeClr val="tx1"/>
+              </a:solidFill>
+            </a:endParaRPr>
+          </a:p>
+        </p:txBody>
+      </p:sp>
+    </p:spTree>
+    <p:extLst>
+      <p:ext uri="{BB962C8B-B14F-4D97-AF65-F5344CB8AC3E}">
+        <p14:creationId xmlns:p14="http://schemas.microsoft.com/office/powerpoint/2010/main" val="2858834675"/>
+      </p:ext>
+    </p:extLst>
+  </p:cSld>
+  <p:clrMapOvr>
+    <a:masterClrMapping/>
+  </p:clrMapOvr>
+</p:sld>
+</file>
+
+<file path=ppt/slides/slide11.xml><?xml version="1.0" encoding="utf-8"?>
+<p:sld xmlns:a="http://schemas.openxmlformats.org/drawingml/2006/main" xmlns:r="http://schemas.openxmlformats.org/officeDocument/2006/relationships" xmlns:p="http://schemas.openxmlformats.org/presentationml/2006/main">
+  <p:cSld>
+    <p:spTree>
+      <p:nvGrpSpPr>
         <p:cNvPr id="1" name="Shape 296"/>
         <p:cNvGrpSpPr/>
         <p:nvPr/>
@@ -8372,7 +8603,7 @@
             </a:pPr>
             <a:fld id="{00000000-1234-1234-1234-123412341234}" type="slidenum">
               <a:rPr lang="en"/>
-              <a:t>10</a:t>
+              <a:t>11</a:t>
             </a:fld>
             <a:endParaRPr/>
           </a:p>
@@ -8613,6 +8844,215 @@
   <p:cSld>
     <p:spTree>
       <p:nvGrpSpPr>
+        <p:cNvPr id="1" name="Shape 60"/>
+        <p:cNvGrpSpPr/>
+        <p:nvPr/>
+      </p:nvGrpSpPr>
+      <p:grpSpPr>
+        <a:xfrm>
+          <a:off x="0" y="0"/>
+          <a:ext cx="0" cy="0"/>
+          <a:chOff x="0" y="0"/>
+          <a:chExt cx="0" cy="0"/>
+        </a:xfrm>
+      </p:grpSpPr>
+      <p:sp>
+        <p:nvSpPr>
+          <p:cNvPr id="66" name="Google Shape;66;p12"/>
+          <p:cNvSpPr txBox="1"/>
+          <p:nvPr/>
+        </p:nvSpPr>
+        <p:spPr>
+          <a:xfrm>
+            <a:off x="835350" y="1575621"/>
+            <a:ext cx="7473300" cy="2159949"/>
+          </a:xfrm>
+          <a:prstGeom prst="rect">
+            <a:avLst/>
+          </a:prstGeom>
+          <a:noFill/>
+          <a:ln>
+            <a:noFill/>
+          </a:ln>
+        </p:spPr>
+        <p:txBody>
+          <a:bodyPr spcFirstLastPara="1" wrap="square" lIns="91425" tIns="91425" rIns="91425" bIns="91425" anchor="t" anchorCtr="0">
+            <a:noAutofit/>
+          </a:bodyPr>
+          <a:lstStyle/>
+          <a:p>
+            <a:pPr marL="342900" lvl="0" indent="-342900" rtl="0">
+              <a:spcBef>
+                <a:spcPts val="1000"/>
+              </a:spcBef>
+              <a:spcAft>
+                <a:spcPts val="1000"/>
+              </a:spcAft>
+              <a:buClr>
+                <a:schemeClr val="bg1"/>
+              </a:buClr>
+              <a:buFont typeface="Arial" panose="020B0604020202020204" pitchFamily="34" charset="0"/>
+              <a:buChar char="•"/>
+            </a:pPr>
+            <a:r>
+              <a:rPr lang="en-US" sz="2000" dirty="0">
+                <a:solidFill>
+                  <a:schemeClr val="bg1"/>
+                </a:solidFill>
+                <a:latin typeface="Walter Turncoat" panose="020B0604020202020204" charset="0"/>
+                <a:ea typeface="Sniglet"/>
+                <a:cs typeface="Sniglet"/>
+                <a:sym typeface="Sniglet"/>
+              </a:rPr>
+              <a:t>NETWORK ARCHITECTURE</a:t>
+            </a:r>
+          </a:p>
+          <a:p>
+            <a:pPr marL="342900" lvl="0" indent="-342900" rtl="0">
+              <a:spcBef>
+                <a:spcPts val="1000"/>
+              </a:spcBef>
+              <a:spcAft>
+                <a:spcPts val="1000"/>
+              </a:spcAft>
+              <a:buClr>
+                <a:schemeClr val="bg1"/>
+              </a:buClr>
+              <a:buFont typeface="Arial" panose="020B0604020202020204" pitchFamily="34" charset="0"/>
+              <a:buChar char="•"/>
+            </a:pPr>
+            <a:r>
+              <a:rPr lang="en-US" sz="2000" dirty="0">
+                <a:solidFill>
+                  <a:schemeClr val="bg1"/>
+                </a:solidFill>
+                <a:latin typeface="Walter Turncoat" panose="020B0604020202020204" charset="0"/>
+                <a:ea typeface="Sniglet"/>
+                <a:cs typeface="Sniglet"/>
+                <a:sym typeface="Sniglet"/>
+              </a:rPr>
+              <a:t>DEMO</a:t>
+            </a:r>
+          </a:p>
+        </p:txBody>
+      </p:sp>
+      <p:sp>
+        <p:nvSpPr>
+          <p:cNvPr id="67" name="Google Shape;67;p12"/>
+          <p:cNvSpPr txBox="1">
+            <a:spLocks noGrp="1"/>
+          </p:cNvSpPr>
+          <p:nvPr>
+            <p:ph type="sldNum" idx="12"/>
+          </p:nvPr>
+        </p:nvSpPr>
+        <p:spPr>
+          <a:xfrm>
+            <a:off x="4297650" y="4832975"/>
+            <a:ext cx="548700" cy="310500"/>
+          </a:xfrm>
+          <a:prstGeom prst="rect">
+            <a:avLst/>
+          </a:prstGeom>
+        </p:spPr>
+        <p:txBody>
+          <a:bodyPr spcFirstLastPara="1" wrap="square" lIns="91425" tIns="91425" rIns="91425" bIns="91425" anchor="t" anchorCtr="0">
+            <a:noAutofit/>
+          </a:bodyPr>
+          <a:lstStyle/>
+          <a:p>
+            <a:pPr marL="0" lvl="0" indent="0" algn="ctr" rtl="0">
+              <a:spcBef>
+                <a:spcPts val="0"/>
+              </a:spcBef>
+              <a:spcAft>
+                <a:spcPts val="0"/>
+              </a:spcAft>
+              <a:buNone/>
+            </a:pPr>
+            <a:fld id="{00000000-1234-1234-1234-123412341234}" type="slidenum">
+              <a:rPr lang="en"/>
+              <a:t>3</a:t>
+            </a:fld>
+            <a:endParaRPr/>
+          </a:p>
+        </p:txBody>
+      </p:sp>
+      <p:sp>
+        <p:nvSpPr>
+          <p:cNvPr id="4" name="Google Shape;66;p12">
+            <a:extLst>
+              <a:ext uri="{FF2B5EF4-FFF2-40B4-BE49-F238E27FC236}">
+                <a16:creationId xmlns:a16="http://schemas.microsoft.com/office/drawing/2014/main" id="{832D2975-878C-4B86-9729-995C09C54794}"/>
+              </a:ext>
+            </a:extLst>
+          </p:cNvPr>
+          <p:cNvSpPr txBox="1"/>
+          <p:nvPr/>
+        </p:nvSpPr>
+        <p:spPr>
+          <a:xfrm>
+            <a:off x="888512" y="218199"/>
+            <a:ext cx="6731488" cy="703290"/>
+          </a:xfrm>
+          <a:prstGeom prst="rect">
+            <a:avLst/>
+          </a:prstGeom>
+          <a:noFill/>
+          <a:ln>
+            <a:noFill/>
+          </a:ln>
+        </p:spPr>
+        <p:txBody>
+          <a:bodyPr spcFirstLastPara="1" wrap="square" lIns="91425" tIns="91425" rIns="91425" bIns="91425" anchor="t" anchorCtr="0">
+            <a:noAutofit/>
+          </a:bodyPr>
+          <a:lstStyle/>
+          <a:p>
+            <a:pPr lvl="0" algn="ctr" rtl="0">
+              <a:spcBef>
+                <a:spcPts val="1000"/>
+              </a:spcBef>
+              <a:spcAft>
+                <a:spcPts val="1000"/>
+              </a:spcAft>
+              <a:buClr>
+                <a:schemeClr val="bg1"/>
+              </a:buClr>
+            </a:pPr>
+            <a:r>
+              <a:rPr lang="en-US" sz="3200" dirty="0">
+                <a:solidFill>
+                  <a:schemeClr val="bg1"/>
+                </a:solidFill>
+                <a:latin typeface="Walter Turncoat" panose="020B0604020202020204" charset="0"/>
+                <a:ea typeface="Sniglet"/>
+                <a:cs typeface="Sniglet"/>
+                <a:sym typeface="Sniglet"/>
+              </a:rPr>
+              <a:t>Agenda</a:t>
+            </a:r>
+          </a:p>
+        </p:txBody>
+      </p:sp>
+    </p:spTree>
+    <p:extLst>
+      <p:ext uri="{BB962C8B-B14F-4D97-AF65-F5344CB8AC3E}">
+        <p14:creationId xmlns:p14="http://schemas.microsoft.com/office/powerpoint/2010/main" val="2925692762"/>
+      </p:ext>
+    </p:extLst>
+  </p:cSld>
+  <p:clrMapOvr>
+    <a:masterClrMapping/>
+  </p:clrMapOvr>
+</p:sld>
+</file>
+
+<file path=ppt/slides/slide4.xml><?xml version="1.0" encoding="utf-8"?>
+<p:sld xmlns:a="http://schemas.openxmlformats.org/drawingml/2006/main" xmlns:r="http://schemas.openxmlformats.org/officeDocument/2006/relationships" xmlns:p="http://schemas.openxmlformats.org/presentationml/2006/main">
+  <p:cSld>
+    <p:spTree>
+      <p:nvGrpSpPr>
         <p:cNvPr id="1" name="Shape 71"/>
         <p:cNvGrpSpPr/>
         <p:nvPr/>
@@ -8701,7 +9141,7 @@
                   <a:schemeClr val="tx1"/>
                 </a:solidFill>
               </a:rPr>
-              <a:t>3</a:t>
+              <a:t>4</a:t>
             </a:fld>
             <a:endParaRPr dirty="0">
               <a:solidFill>
@@ -8719,7 +9159,7 @@
 </p:sld>
 </file>
 
-<file path=ppt/slides/slide4.xml><?xml version="1.0" encoding="utf-8"?>
+<file path=ppt/slides/slide5.xml><?xml version="1.0" encoding="utf-8"?>
 <p:sld xmlns:a="http://schemas.openxmlformats.org/drawingml/2006/main" xmlns:r="http://schemas.openxmlformats.org/officeDocument/2006/relationships" xmlns:p="http://schemas.openxmlformats.org/presentationml/2006/main">
   <p:cSld>
     <p:spTree>
@@ -8782,7 +9222,7 @@
                   <a:schemeClr val="bg1"/>
                 </a:solidFill>
               </a:rPr>
-              <a:t>4</a:t>
+              <a:t>5</a:t>
             </a:fld>
             <a:endParaRPr dirty="0">
               <a:solidFill>
@@ -8792,8 +9232,8 @@
           </a:p>
         </p:txBody>
       </p:sp>
-      <mc:AlternateContent xmlns:mc="http://schemas.openxmlformats.org/markup-compatibility/2006">
-        <mc:Choice xmlns:a14="http://schemas.microsoft.com/office/drawing/2010/main" Requires="a14">
+      <mc:AlternateContent xmlns:mc="http://schemas.openxmlformats.org/markup-compatibility/2006" xmlns:a14="http://schemas.microsoft.com/office/drawing/2010/main">
+        <mc:Choice Requires="a14">
           <p:sp>
             <p:nvSpPr>
               <p:cNvPr id="3" name="TextBox 2">
@@ -8822,6 +9262,7 @@
               </a:bodyPr>
               <a:lstStyle/>
               <a:p>
+                <a:pPr/>
                 <a14:m>
                   <m:oMathPara xmlns:m="http://schemas.openxmlformats.org/officeDocument/2006/math">
                     <m:oMathParaPr>
@@ -8944,7 +9385,7 @@
             </p:txBody>
           </p:sp>
         </mc:Choice>
-        <mc:Fallback>
+        <mc:Fallback xmlns="">
           <p:sp>
             <p:nvSpPr>
               <p:cNvPr id="3" name="TextBox 2">
@@ -8989,8 +9430,8 @@
           </p:sp>
         </mc:Fallback>
       </mc:AlternateContent>
-      <mc:AlternateContent xmlns:mc="http://schemas.openxmlformats.org/markup-compatibility/2006">
-        <mc:Choice xmlns:a14="http://schemas.microsoft.com/office/drawing/2010/main" Requires="a14">
+      <mc:AlternateContent xmlns:mc="http://schemas.openxmlformats.org/markup-compatibility/2006" xmlns:a14="http://schemas.microsoft.com/office/drawing/2010/main">
+        <mc:Choice Requires="a14">
           <p:sp>
             <p:nvSpPr>
               <p:cNvPr id="6" name="TextBox 5">
@@ -9019,6 +9460,7 @@
               </a:bodyPr>
               <a:lstStyle/>
               <a:p>
+                <a:pPr/>
                 <a14:m>
                   <m:oMathPara xmlns:m="http://schemas.openxmlformats.org/officeDocument/2006/math">
                     <m:oMathParaPr>
@@ -9141,7 +9583,7 @@
             </p:txBody>
           </p:sp>
         </mc:Choice>
-        <mc:Fallback>
+        <mc:Fallback xmlns="">
           <p:sp>
             <p:nvSpPr>
               <p:cNvPr id="6" name="TextBox 5">
@@ -9186,8 +9628,8 @@
           </p:sp>
         </mc:Fallback>
       </mc:AlternateContent>
-      <mc:AlternateContent xmlns:mc="http://schemas.openxmlformats.org/markup-compatibility/2006">
-        <mc:Choice xmlns:a14="http://schemas.microsoft.com/office/drawing/2010/main" Requires="a14">
+      <mc:AlternateContent xmlns:mc="http://schemas.openxmlformats.org/markup-compatibility/2006" xmlns:a14="http://schemas.microsoft.com/office/drawing/2010/main">
+        <mc:Choice Requires="a14">
           <p:sp>
             <p:nvSpPr>
               <p:cNvPr id="8" name="TextBox 7">
@@ -9216,6 +9658,7 @@
               </a:bodyPr>
               <a:lstStyle/>
               <a:p>
+                <a:pPr/>
                 <a14:m>
                   <m:oMathPara xmlns:m="http://schemas.openxmlformats.org/officeDocument/2006/math">
                     <m:oMathParaPr>
@@ -9381,7 +9824,7 @@
             </p:txBody>
           </p:sp>
         </mc:Choice>
-        <mc:Fallback>
+        <mc:Fallback xmlns="">
           <p:sp>
             <p:nvSpPr>
               <p:cNvPr id="8" name="TextBox 7">
@@ -9426,8 +9869,8 @@
           </p:sp>
         </mc:Fallback>
       </mc:AlternateContent>
-      <mc:AlternateContent xmlns:mc="http://schemas.openxmlformats.org/markup-compatibility/2006">
-        <mc:Choice xmlns:a14="http://schemas.microsoft.com/office/drawing/2010/main" Requires="a14">
+      <mc:AlternateContent xmlns:mc="http://schemas.openxmlformats.org/markup-compatibility/2006" xmlns:a14="http://schemas.microsoft.com/office/drawing/2010/main">
+        <mc:Choice Requires="a14">
           <p:sp>
             <p:nvSpPr>
               <p:cNvPr id="9" name="TextBox 8">
@@ -9456,6 +9899,7 @@
               </a:bodyPr>
               <a:lstStyle/>
               <a:p>
+                <a:pPr/>
                 <a14:m>
                   <m:oMathPara xmlns:m="http://schemas.openxmlformats.org/officeDocument/2006/math">
                     <m:oMathParaPr>
@@ -9628,7 +10072,7 @@
             </p:txBody>
           </p:sp>
         </mc:Choice>
-        <mc:Fallback>
+        <mc:Fallback xmlns="">
           <p:sp>
             <p:nvSpPr>
               <p:cNvPr id="9" name="TextBox 8">
@@ -9673,8 +10117,8 @@
           </p:sp>
         </mc:Fallback>
       </mc:AlternateContent>
-      <mc:AlternateContent xmlns:mc="http://schemas.openxmlformats.org/markup-compatibility/2006">
-        <mc:Choice xmlns:a14="http://schemas.microsoft.com/office/drawing/2010/main" Requires="a14">
+      <mc:AlternateContent xmlns:mc="http://schemas.openxmlformats.org/markup-compatibility/2006" xmlns:a14="http://schemas.microsoft.com/office/drawing/2010/main">
+        <mc:Choice Requires="a14">
           <p:sp>
             <p:nvSpPr>
               <p:cNvPr id="10" name="TextBox 9">
@@ -9990,7 +10434,7 @@
             </p:txBody>
           </p:sp>
         </mc:Choice>
-        <mc:Fallback>
+        <mc:Fallback xmlns="">
           <p:sp>
             <p:nvSpPr>
               <p:cNvPr id="10" name="TextBox 9">
@@ -10035,8 +10479,8 @@
           </p:sp>
         </mc:Fallback>
       </mc:AlternateContent>
-      <mc:AlternateContent xmlns:mc="http://schemas.openxmlformats.org/markup-compatibility/2006">
-        <mc:Choice xmlns:a14="http://schemas.microsoft.com/office/drawing/2010/main" Requires="a14">
+      <mc:AlternateContent xmlns:mc="http://schemas.openxmlformats.org/markup-compatibility/2006" xmlns:a14="http://schemas.microsoft.com/office/drawing/2010/main">
+        <mc:Choice Requires="a14">
           <p:sp>
             <p:nvSpPr>
               <p:cNvPr id="11" name="TextBox 10">
@@ -10065,6 +10509,7 @@
               </a:bodyPr>
               <a:lstStyle/>
               <a:p>
+                <a:pPr/>
                 <a14:m>
                   <m:oMathPara xmlns:m="http://schemas.openxmlformats.org/officeDocument/2006/math">
                     <m:oMathParaPr>
@@ -10198,7 +10643,7 @@
             </p:txBody>
           </p:sp>
         </mc:Choice>
-        <mc:Fallback>
+        <mc:Fallback xmlns="">
           <p:sp>
             <p:nvSpPr>
               <p:cNvPr id="11" name="TextBox 10">
@@ -10243,8 +10688,8 @@
           </p:sp>
         </mc:Fallback>
       </mc:AlternateContent>
-      <mc:AlternateContent xmlns:mc="http://schemas.openxmlformats.org/markup-compatibility/2006">
-        <mc:Choice xmlns:a14="http://schemas.microsoft.com/office/drawing/2010/main" Requires="a14">
+      <mc:AlternateContent xmlns:mc="http://schemas.openxmlformats.org/markup-compatibility/2006" xmlns:a14="http://schemas.microsoft.com/office/drawing/2010/main">
+        <mc:Choice Requires="a14">
           <p:sp>
             <p:nvSpPr>
               <p:cNvPr id="13" name="TextBox 12">
@@ -10273,6 +10718,7 @@
               </a:bodyPr>
               <a:lstStyle/>
               <a:p>
+                <a:pPr/>
                 <a14:m>
                   <m:oMathPara xmlns:m="http://schemas.openxmlformats.org/officeDocument/2006/math">
                     <m:oMathParaPr>
@@ -10447,7 +10893,7 @@
             </p:txBody>
           </p:sp>
         </mc:Choice>
-        <mc:Fallback>
+        <mc:Fallback xmlns="">
           <p:sp>
             <p:nvSpPr>
               <p:cNvPr id="13" name="TextBox 12">
@@ -10505,7 +10951,7 @@
 </p:sld>
 </file>
 
-<file path=ppt/slides/slide5.xml><?xml version="1.0" encoding="utf-8"?>
+<file path=ppt/slides/slide6.xml><?xml version="1.0" encoding="utf-8"?>
 <p:sld xmlns:a="http://schemas.openxmlformats.org/drawingml/2006/main" xmlns:r="http://schemas.openxmlformats.org/officeDocument/2006/relationships" xmlns:p="http://schemas.openxmlformats.org/presentationml/2006/main">
   <p:cSld>
     <p:spTree>
@@ -10598,7 +11044,7 @@
                   <a:schemeClr val="tx1"/>
                 </a:solidFill>
               </a:rPr>
-              <a:t>5</a:t>
+              <a:t>6</a:t>
             </a:fld>
             <a:endParaRPr dirty="0">
               <a:solidFill>
@@ -10616,7 +11062,7 @@
 </p:sld>
 </file>
 
-<file path=ppt/slides/slide6.xml><?xml version="1.0" encoding="utf-8"?>
+<file path=ppt/slides/slide7.xml><?xml version="1.0" encoding="utf-8"?>
 <p:sld xmlns:a="http://schemas.openxmlformats.org/drawingml/2006/main" xmlns:r="http://schemas.openxmlformats.org/officeDocument/2006/relationships" xmlns:p="http://schemas.openxmlformats.org/presentationml/2006/main">
   <p:cSld>
     <p:spTree>
@@ -10679,7 +11125,7 @@
                   <a:schemeClr val="bg1"/>
                 </a:solidFill>
               </a:rPr>
-              <a:t>6</a:t>
+              <a:t>7</a:t>
             </a:fld>
             <a:endParaRPr dirty="0">
               <a:solidFill>
@@ -10689,8 +11135,8 @@
           </a:p>
         </p:txBody>
       </p:sp>
-      <mc:AlternateContent xmlns:mc="http://schemas.openxmlformats.org/markup-compatibility/2006">
-        <mc:Choice xmlns:a14="http://schemas.microsoft.com/office/drawing/2010/main" Requires="a14">
+      <mc:AlternateContent xmlns:mc="http://schemas.openxmlformats.org/markup-compatibility/2006" xmlns:a14="http://schemas.microsoft.com/office/drawing/2010/main">
+        <mc:Choice Requires="a14">
           <p:sp>
             <p:nvSpPr>
               <p:cNvPr id="4" name="TextBox 3">
@@ -10706,7 +11152,7 @@
             <p:spPr>
               <a:xfrm>
                 <a:off x="1463741" y="1066659"/>
-                <a:ext cx="6216503" cy="815608"/>
+                <a:ext cx="6216503" cy="781752"/>
               </a:xfrm>
               <a:prstGeom prst="rect">
                 <a:avLst/>
@@ -10719,6 +11165,7 @@
               </a:bodyPr>
               <a:lstStyle/>
               <a:p>
+                <a:pPr/>
                 <a14:m>
                   <m:oMathPara xmlns:m="http://schemas.openxmlformats.org/officeDocument/2006/math">
                     <m:oMathParaPr>
@@ -10852,6 +11299,7 @@
                       <m:nary>
                         <m:naryPr>
                           <m:chr m:val="∑"/>
+                          <m:supHide m:val="on"/>
                           <m:ctrlPr>
                             <a:rPr lang="pt-BR" sz="2000" i="1" smtClean="0">
                               <a:solidFill>
@@ -10872,7 +11320,16 @@
                               </a:solidFill>
                               <a:latin typeface="Cambria Math" panose="02040503050406030204" pitchFamily="18" charset="0"/>
                             </a:rPr>
-                            <m:t>𝑎𝑛𝑦</m:t>
+                            <m:t>𝑎</m:t>
+                          </m:r>
+                          <m:r>
+                            <a:rPr lang="en-US" sz="2000" b="0" i="1" smtClean="0">
+                              <a:solidFill>
+                                <a:schemeClr val="bg1"/>
+                              </a:solidFill>
+                              <a:latin typeface="Cambria Math" panose="02040503050406030204" pitchFamily="18" charset="0"/>
+                            </a:rPr>
+                            <m:t>𝑛𝑦</m:t>
                           </m:r>
                           <m:r>
                             <a:rPr lang="en-US" sz="2000" b="0" i="1" smtClean="0">
@@ -10893,17 +11350,7 @@
                             <m:t>𝑗</m:t>
                           </m:r>
                         </m:sub>
-                        <m:sup>
-                          <m:r>
-                            <a:rPr lang="en-US" sz="2000" b="0" i="1" smtClean="0">
-                              <a:solidFill>
-                                <a:schemeClr val="bg1"/>
-                              </a:solidFill>
-                              <a:latin typeface="Cambria Math" panose="02040503050406030204" pitchFamily="18" charset="0"/>
-                            </a:rPr>
-                            <m:t>.</m:t>
-                          </m:r>
-                        </m:sup>
+                        <m:sup/>
                         <m:e>
                           <m:func>
                             <m:funcPr>
@@ -11251,7 +11698,7 @@
             </p:txBody>
           </p:sp>
         </mc:Choice>
-        <mc:Fallback>
+        <mc:Fallback xmlns="">
           <p:sp>
             <p:nvSpPr>
               <p:cNvPr id="4" name="TextBox 3">
@@ -11269,7 +11716,7 @@
             <p:spPr>
               <a:xfrm>
                 <a:off x="1463741" y="1066659"/>
-                <a:ext cx="6216503" cy="815608"/>
+                <a:ext cx="6216503" cy="781752"/>
               </a:xfrm>
               <a:prstGeom prst="rect">
                 <a:avLst/>
@@ -11296,8 +11743,8 @@
           </p:sp>
         </mc:Fallback>
       </mc:AlternateContent>
-      <mc:AlternateContent xmlns:mc="http://schemas.openxmlformats.org/markup-compatibility/2006">
-        <mc:Choice xmlns:a14="http://schemas.microsoft.com/office/drawing/2010/main" Requires="a14">
+      <mc:AlternateContent xmlns:mc="http://schemas.openxmlformats.org/markup-compatibility/2006" xmlns:a14="http://schemas.microsoft.com/office/drawing/2010/main">
+        <mc:Choice Requires="a14">
           <p:sp>
             <p:nvSpPr>
               <p:cNvPr id="14" name="TextBox 13">
@@ -11326,6 +11773,7 @@
               </a:bodyPr>
               <a:lstStyle/>
               <a:p>
+                <a:pPr/>
                 <a14:m>
                   <m:oMathPara xmlns:m="http://schemas.openxmlformats.org/officeDocument/2006/math">
                     <m:oMathParaPr>
@@ -11498,7 +11946,7 @@
             </p:txBody>
           </p:sp>
         </mc:Choice>
-        <mc:Fallback>
+        <mc:Fallback xmlns="">
           <p:sp>
             <p:nvSpPr>
               <p:cNvPr id="14" name="TextBox 13">
@@ -11543,8 +11991,8 @@
           </p:sp>
         </mc:Fallback>
       </mc:AlternateContent>
-      <mc:AlternateContent xmlns:mc="http://schemas.openxmlformats.org/markup-compatibility/2006">
-        <mc:Choice xmlns:a14="http://schemas.microsoft.com/office/drawing/2010/main" Requires="a14">
+      <mc:AlternateContent xmlns:mc="http://schemas.openxmlformats.org/markup-compatibility/2006" xmlns:a14="http://schemas.microsoft.com/office/drawing/2010/main">
+        <mc:Choice Requires="a14">
           <p:sp>
             <p:nvSpPr>
               <p:cNvPr id="15" name="TextBox 14">
@@ -11573,6 +12021,7 @@
               </a:bodyPr>
               <a:lstStyle/>
               <a:p>
+                <a:pPr/>
                 <a14:m>
                   <m:oMathPara xmlns:m="http://schemas.openxmlformats.org/officeDocument/2006/math">
                     <m:oMathParaPr>
@@ -11785,7 +12234,7 @@
             </p:txBody>
           </p:sp>
         </mc:Choice>
-        <mc:Fallback>
+        <mc:Fallback xmlns="">
           <p:sp>
             <p:nvSpPr>
               <p:cNvPr id="15" name="TextBox 14">
@@ -11830,8 +12279,8 @@
           </p:sp>
         </mc:Fallback>
       </mc:AlternateContent>
-      <mc:AlternateContent xmlns:mc="http://schemas.openxmlformats.org/markup-compatibility/2006">
-        <mc:Choice xmlns:a14="http://schemas.microsoft.com/office/drawing/2010/main" Requires="a14">
+      <mc:AlternateContent xmlns:mc="http://schemas.openxmlformats.org/markup-compatibility/2006" xmlns:a14="http://schemas.microsoft.com/office/drawing/2010/main">
+        <mc:Choice Requires="a14">
           <p:sp>
             <p:nvSpPr>
               <p:cNvPr id="16" name="TextBox 15">
@@ -11860,6 +12309,7 @@
               </a:bodyPr>
               <a:lstStyle/>
               <a:p>
+                <a:pPr/>
                 <a14:m>
                   <m:oMathPara xmlns:m="http://schemas.openxmlformats.org/officeDocument/2006/math">
                     <m:oMathParaPr>
@@ -12066,7 +12516,7 @@
             </p:txBody>
           </p:sp>
         </mc:Choice>
-        <mc:Fallback>
+        <mc:Fallback xmlns="">
           <p:sp>
             <p:nvSpPr>
               <p:cNvPr id="16" name="TextBox 15">
@@ -12111,8 +12561,8 @@
           </p:sp>
         </mc:Fallback>
       </mc:AlternateContent>
-      <mc:AlternateContent xmlns:mc="http://schemas.openxmlformats.org/markup-compatibility/2006">
-        <mc:Choice xmlns:a14="http://schemas.microsoft.com/office/drawing/2010/main" Requires="a14">
+      <mc:AlternateContent xmlns:mc="http://schemas.openxmlformats.org/markup-compatibility/2006" xmlns:a14="http://schemas.microsoft.com/office/drawing/2010/main">
+        <mc:Choice Requires="a14">
           <p:sp>
             <p:nvSpPr>
               <p:cNvPr id="17" name="TextBox 16">
@@ -12141,6 +12591,7 @@
               </a:bodyPr>
               <a:lstStyle/>
               <a:p>
+                <a:pPr/>
                 <a14:m>
                   <m:oMathPara xmlns:m="http://schemas.openxmlformats.org/officeDocument/2006/math">
                     <m:oMathParaPr>
@@ -12347,7 +12798,7 @@
             </p:txBody>
           </p:sp>
         </mc:Choice>
-        <mc:Fallback>
+        <mc:Fallback xmlns="">
           <p:sp>
             <p:nvSpPr>
               <p:cNvPr id="17" name="TextBox 16">
@@ -12392,8 +12843,8 @@
           </p:sp>
         </mc:Fallback>
       </mc:AlternateContent>
-      <mc:AlternateContent xmlns:mc="http://schemas.openxmlformats.org/markup-compatibility/2006">
-        <mc:Choice xmlns:a14="http://schemas.microsoft.com/office/drawing/2010/main" Requires="a14">
+      <mc:AlternateContent xmlns:mc="http://schemas.openxmlformats.org/markup-compatibility/2006" xmlns:a14="http://schemas.microsoft.com/office/drawing/2010/main">
+        <mc:Choice Requires="a14">
           <p:sp>
             <p:nvSpPr>
               <p:cNvPr id="18" name="TextBox 17">
@@ -12422,6 +12873,7 @@
               </a:bodyPr>
               <a:lstStyle/>
               <a:p>
+                <a:pPr/>
                 <a14:m>
                   <m:oMathPara xmlns:m="http://schemas.openxmlformats.org/officeDocument/2006/math">
                     <m:oMathParaPr>
@@ -12583,7 +13035,7 @@
             </p:txBody>
           </p:sp>
         </mc:Choice>
-        <mc:Fallback>
+        <mc:Fallback xmlns="">
           <p:sp>
             <p:nvSpPr>
               <p:cNvPr id="18" name="TextBox 17">
@@ -12628,8 +13080,8 @@
           </p:sp>
         </mc:Fallback>
       </mc:AlternateContent>
-      <mc:AlternateContent xmlns:mc="http://schemas.openxmlformats.org/markup-compatibility/2006">
-        <mc:Choice xmlns:a14="http://schemas.microsoft.com/office/drawing/2010/main" Requires="a14">
+      <mc:AlternateContent xmlns:mc="http://schemas.openxmlformats.org/markup-compatibility/2006" xmlns:a14="http://schemas.microsoft.com/office/drawing/2010/main">
+        <mc:Choice Requires="a14">
           <p:sp>
             <p:nvSpPr>
               <p:cNvPr id="19" name="TextBox 18">
@@ -12658,6 +13110,7 @@
               </a:bodyPr>
               <a:lstStyle/>
               <a:p>
+                <a:pPr/>
                 <a14:m>
                   <m:oMathPara xmlns:m="http://schemas.openxmlformats.org/officeDocument/2006/math">
                     <m:oMathParaPr>
@@ -12708,6 +13161,7 @@
                       <m:nary>
                         <m:naryPr>
                           <m:chr m:val="∑"/>
+                          <m:supHide m:val="on"/>
                           <m:ctrlPr>
                             <a:rPr lang="pt-BR" sz="1800" i="1" smtClean="0">
                               <a:solidFill>
@@ -12728,7 +13182,16 @@
                               </a:solidFill>
                               <a:latin typeface="Cambria Math" panose="02040503050406030204" pitchFamily="18" charset="0"/>
                             </a:rPr>
-                            <m:t>𝑎𝑛𝑦</m:t>
+                            <m:t>𝑎</m:t>
+                          </m:r>
+                          <m:r>
+                            <a:rPr lang="en-US" sz="1800" b="0" i="1" smtClean="0">
+                              <a:solidFill>
+                                <a:schemeClr val="bg1"/>
+                              </a:solidFill>
+                              <a:latin typeface="Cambria Math" panose="02040503050406030204" pitchFamily="18" charset="0"/>
+                            </a:rPr>
+                            <m:t>𝑛𝑦</m:t>
                           </m:r>
                           <m:r>
                             <a:rPr lang="en-US" sz="1800" b="0" i="1" smtClean="0">
@@ -12749,17 +13212,7 @@
                             <m:t>𝑗</m:t>
                           </m:r>
                         </m:sub>
-                        <m:sup>
-                          <m:r>
-                            <a:rPr lang="en-US" sz="1800" b="0" i="1" smtClean="0">
-                              <a:solidFill>
-                                <a:schemeClr val="bg1"/>
-                              </a:solidFill>
-                              <a:latin typeface="Cambria Math" panose="02040503050406030204" pitchFamily="18" charset="0"/>
-                            </a:rPr>
-                            <m:t>.</m:t>
-                          </m:r>
-                        </m:sup>
+                        <m:sup/>
                         <m:e>
                           <m:func>
                             <m:funcPr>
@@ -13035,7 +13488,7 @@
             </p:txBody>
           </p:sp>
         </mc:Choice>
-        <mc:Fallback>
+        <mc:Fallback xmlns="">
           <p:sp>
             <p:nvSpPr>
               <p:cNvPr id="19" name="TextBox 18">
@@ -13093,7 +13546,7 @@
 </p:sld>
 </file>
 
-<file path=ppt/slides/slide7.xml><?xml version="1.0" encoding="utf-8"?>
+<file path=ppt/slides/slide8.xml><?xml version="1.0" encoding="utf-8"?>
 <p:sld xmlns:a="http://schemas.openxmlformats.org/drawingml/2006/main" xmlns:r="http://schemas.openxmlformats.org/officeDocument/2006/relationships" xmlns:p="http://schemas.openxmlformats.org/presentationml/2006/main">
   <p:cSld>
     <p:spTree>
@@ -13156,7 +13609,7 @@
                   <a:schemeClr val="bg1"/>
                 </a:solidFill>
               </a:rPr>
-              <a:t>7</a:t>
+              <a:t>8</a:t>
             </a:fld>
             <a:endParaRPr dirty="0">
               <a:solidFill>
@@ -13166,8 +13619,8 @@
           </a:p>
         </p:txBody>
       </p:sp>
-      <mc:AlternateContent xmlns:mc="http://schemas.openxmlformats.org/markup-compatibility/2006">
-        <mc:Choice xmlns:a14="http://schemas.microsoft.com/office/drawing/2010/main" Requires="a14">
+      <mc:AlternateContent xmlns:mc="http://schemas.openxmlformats.org/markup-compatibility/2006" xmlns:a14="http://schemas.microsoft.com/office/drawing/2010/main">
+        <mc:Choice Requires="a14">
           <p:sp>
             <p:nvSpPr>
               <p:cNvPr id="14" name="TextBox 13">
@@ -13196,6 +13649,7 @@
               </a:bodyPr>
               <a:lstStyle/>
               <a:p>
+                <a:pPr/>
                 <a14:m>
                   <m:oMathPara xmlns:m="http://schemas.openxmlformats.org/officeDocument/2006/math">
                     <m:oMathParaPr>
@@ -13241,7 +13695,7 @@
             </p:txBody>
           </p:sp>
         </mc:Choice>
-        <mc:Fallback>
+        <mc:Fallback xmlns="">
           <p:sp>
             <p:nvSpPr>
               <p:cNvPr id="14" name="TextBox 13">
@@ -13286,8 +13740,8 @@
           </p:sp>
         </mc:Fallback>
       </mc:AlternateContent>
-      <mc:AlternateContent xmlns:mc="http://schemas.openxmlformats.org/markup-compatibility/2006">
-        <mc:Choice xmlns:a14="http://schemas.microsoft.com/office/drawing/2010/main" Requires="a14">
+      <mc:AlternateContent xmlns:mc="http://schemas.openxmlformats.org/markup-compatibility/2006" xmlns:a14="http://schemas.microsoft.com/office/drawing/2010/main">
+        <mc:Choice Requires="a14">
           <p:sp>
             <p:nvSpPr>
               <p:cNvPr id="10" name="TextBox 9">
@@ -13316,6 +13770,7 @@
               </a:bodyPr>
               <a:lstStyle/>
               <a:p>
+                <a:pPr/>
                 <a14:m>
                   <m:oMathPara xmlns:m="http://schemas.openxmlformats.org/officeDocument/2006/math">
                     <m:oMathParaPr>
@@ -13546,7 +14001,7 @@
             </p:txBody>
           </p:sp>
         </mc:Choice>
-        <mc:Fallback>
+        <mc:Fallback xmlns="">
           <p:sp>
             <p:nvSpPr>
               <p:cNvPr id="10" name="TextBox 9">
@@ -13591,8 +14046,8 @@
           </p:sp>
         </mc:Fallback>
       </mc:AlternateContent>
-      <mc:AlternateContent xmlns:mc="http://schemas.openxmlformats.org/markup-compatibility/2006">
-        <mc:Choice xmlns:a14="http://schemas.microsoft.com/office/drawing/2010/main" Requires="a14">
+      <mc:AlternateContent xmlns:mc="http://schemas.openxmlformats.org/markup-compatibility/2006" xmlns:a14="http://schemas.microsoft.com/office/drawing/2010/main">
+        <mc:Choice Requires="a14">
           <p:sp>
             <p:nvSpPr>
               <p:cNvPr id="11" name="TextBox 10">
@@ -13621,6 +14076,7 @@
               </a:bodyPr>
               <a:lstStyle/>
               <a:p>
+                <a:pPr/>
                 <a14:m>
                   <m:oMathPara xmlns:m="http://schemas.openxmlformats.org/officeDocument/2006/math">
                     <m:oMathParaPr>
@@ -13673,7 +14129,7 @@
                       <m:sSub>
                         <m:sSubPr>
                           <m:ctrlPr>
-                            <a:rPr lang="en-US" sz="2000" b="0" i="0" smtClean="0">
+                            <a:rPr lang="en-US" sz="2000" b="0" i="1" smtClean="0">
                               <a:solidFill>
                                 <a:schemeClr val="bg1"/>
                               </a:solidFill>
@@ -14180,7 +14636,7 @@
             </p:txBody>
           </p:sp>
         </mc:Choice>
-        <mc:Fallback>
+        <mc:Fallback xmlns="">
           <p:sp>
             <p:nvSpPr>
               <p:cNvPr id="11" name="TextBox 10">
@@ -14225,8 +14681,8 @@
           </p:sp>
         </mc:Fallback>
       </mc:AlternateContent>
-      <mc:AlternateContent xmlns:mc="http://schemas.openxmlformats.org/markup-compatibility/2006">
-        <mc:Choice xmlns:a14="http://schemas.microsoft.com/office/drawing/2010/main" Requires="a14">
+      <mc:AlternateContent xmlns:mc="http://schemas.openxmlformats.org/markup-compatibility/2006" xmlns:a14="http://schemas.microsoft.com/office/drawing/2010/main">
+        <mc:Choice Requires="a14">
           <p:sp>
             <p:nvSpPr>
               <p:cNvPr id="13" name="TextBox 12">
@@ -14255,6 +14711,7 @@
               </a:bodyPr>
               <a:lstStyle/>
               <a:p>
+                <a:pPr/>
                 <a14:m>
                   <m:oMathPara xmlns:m="http://schemas.openxmlformats.org/officeDocument/2006/math">
                     <m:oMathParaPr>
@@ -14618,7 +15075,9 @@
                                 </m:dPr>
                                 <m:e>
                                   <m:r>
-                                    <a:rPr lang="en-US"/>
+                                    <a:rPr lang="en-US">
+                                      <a:latin typeface="Cambria Math" panose="02040503050406030204" pitchFamily="18" charset="0"/>
+                                    </a:rPr>
                                     <m:t>​</m:t>
                                   </m:r>
                                 </m:e>
@@ -14946,7 +15405,7 @@
             </p:txBody>
           </p:sp>
         </mc:Choice>
-        <mc:Fallback>
+        <mc:Fallback xmlns="">
           <p:sp>
             <p:nvSpPr>
               <p:cNvPr id="13" name="TextBox 12">
@@ -14991,8 +15450,8 @@
           </p:sp>
         </mc:Fallback>
       </mc:AlternateContent>
-      <mc:AlternateContent xmlns:mc="http://schemas.openxmlformats.org/markup-compatibility/2006">
-        <mc:Choice xmlns:a14="http://schemas.microsoft.com/office/drawing/2010/main" Requires="a14">
+      <mc:AlternateContent xmlns:mc="http://schemas.openxmlformats.org/markup-compatibility/2006" xmlns:a14="http://schemas.microsoft.com/office/drawing/2010/main">
+        <mc:Choice Requires="a14">
           <p:sp>
             <p:nvSpPr>
               <p:cNvPr id="20" name="TextBox 19">
@@ -15021,6 +15480,7 @@
               </a:bodyPr>
               <a:lstStyle/>
               <a:p>
+                <a:pPr/>
                 <a14:m>
                   <m:oMathPara xmlns:m="http://schemas.openxmlformats.org/officeDocument/2006/math">
                     <m:oMathParaPr>
@@ -15410,7 +15870,7 @@
             </p:txBody>
           </p:sp>
         </mc:Choice>
-        <mc:Fallback>
+        <mc:Fallback xmlns="">
           <p:sp>
             <p:nvSpPr>
               <p:cNvPr id="20" name="TextBox 19">
@@ -15468,7 +15928,7 @@
 </p:sld>
 </file>
 
-<file path=ppt/slides/slide8.xml><?xml version="1.0" encoding="utf-8"?>
+<file path=ppt/slides/slide9.xml><?xml version="1.0" encoding="utf-8"?>
 <p:sld xmlns:a="http://schemas.openxmlformats.org/drawingml/2006/main" xmlns:r="http://schemas.openxmlformats.org/officeDocument/2006/relationships" xmlns:p="http://schemas.openxmlformats.org/presentationml/2006/main">
   <p:cSld>
     <p:spTree>
@@ -15531,7 +15991,7 @@
                   <a:schemeClr val="bg1"/>
                 </a:solidFill>
               </a:rPr>
-              <a:t>8</a:t>
+              <a:t>9</a:t>
             </a:fld>
             <a:endParaRPr dirty="0">
               <a:solidFill>
@@ -15541,8 +16001,8 @@
           </a:p>
         </p:txBody>
       </p:sp>
-      <mc:AlternateContent xmlns:mc="http://schemas.openxmlformats.org/markup-compatibility/2006">
-        <mc:Choice xmlns:a14="http://schemas.microsoft.com/office/drawing/2010/main" Requires="a14">
+      <mc:AlternateContent xmlns:mc="http://schemas.openxmlformats.org/markup-compatibility/2006" xmlns:a14="http://schemas.microsoft.com/office/drawing/2010/main">
+        <mc:Choice Requires="a14">
           <p:sp>
             <p:nvSpPr>
               <p:cNvPr id="14" name="TextBox 13">
@@ -15571,6 +16031,7 @@
               </a:bodyPr>
               <a:lstStyle/>
               <a:p>
+                <a:pPr/>
                 <a14:m>
                   <m:oMathPara xmlns:m="http://schemas.openxmlformats.org/officeDocument/2006/math">
                     <m:oMathParaPr>
@@ -15616,7 +16077,7 @@
             </p:txBody>
           </p:sp>
         </mc:Choice>
-        <mc:Fallback>
+        <mc:Fallback xmlns="">
           <p:sp>
             <p:nvSpPr>
               <p:cNvPr id="14" name="TextBox 13">
@@ -15661,8 +16122,8 @@
           </p:sp>
         </mc:Fallback>
       </mc:AlternateContent>
-      <mc:AlternateContent xmlns:mc="http://schemas.openxmlformats.org/markup-compatibility/2006">
-        <mc:Choice xmlns:a14="http://schemas.microsoft.com/office/drawing/2010/main" Requires="a14">
+      <mc:AlternateContent xmlns:mc="http://schemas.openxmlformats.org/markup-compatibility/2006" xmlns:a14="http://schemas.microsoft.com/office/drawing/2010/main">
+        <mc:Choice Requires="a14">
           <p:sp>
             <p:nvSpPr>
               <p:cNvPr id="15" name="TextBox 14">
@@ -15691,6 +16152,7 @@
               </a:bodyPr>
               <a:lstStyle/>
               <a:p>
+                <a:pPr/>
                 <a14:m>
                   <m:oMathPara xmlns:m="http://schemas.openxmlformats.org/officeDocument/2006/math">
                     <m:oMathParaPr>
@@ -15746,7 +16208,7 @@
                       <m:d>
                         <m:dPr>
                           <m:ctrlPr>
-                            <a:rPr lang="en-US" sz="2000" b="0" i="0" smtClean="0">
+                            <a:rPr lang="en-US" sz="2000" b="0" i="1" smtClean="0">
                               <a:solidFill>
                                 <a:schemeClr val="bg1"/>
                               </a:solidFill>
@@ -16022,6 +16484,7 @@
                 </a:endParaRPr>
               </a:p>
               <a:p>
+                <a:pPr/>
                 <a14:m>
                   <m:oMathPara xmlns:m="http://schemas.openxmlformats.org/officeDocument/2006/math">
                     <m:oMathParaPr>
@@ -16380,6 +16843,7 @@
                 </a:endParaRPr>
               </a:p>
               <a:p>
+                <a:pPr/>
                 <a14:m>
                   <m:oMathPara xmlns:m="http://schemas.openxmlformats.org/officeDocument/2006/math">
                     <m:oMathParaPr>
@@ -16627,7 +17091,7 @@
             </p:txBody>
           </p:sp>
         </mc:Choice>
-        <mc:Fallback>
+        <mc:Fallback xmlns="">
           <p:sp>
             <p:nvSpPr>
               <p:cNvPr id="15" name="TextBox 14">
@@ -16706,122 +17170,6 @@
     <p:extLst>
       <p:ext uri="{BB962C8B-B14F-4D97-AF65-F5344CB8AC3E}">
         <p14:creationId xmlns:p14="http://schemas.microsoft.com/office/powerpoint/2010/main" val="3171118833"/>
-      </p:ext>
-    </p:extLst>
-  </p:cSld>
-  <p:clrMapOvr>
-    <a:masterClrMapping/>
-  </p:clrMapOvr>
-</p:sld>
-</file>
-
-<file path=ppt/slides/slide9.xml><?xml version="1.0" encoding="utf-8"?>
-<p:sld xmlns:a="http://schemas.openxmlformats.org/drawingml/2006/main" xmlns:r="http://schemas.openxmlformats.org/officeDocument/2006/relationships" xmlns:p="http://schemas.openxmlformats.org/presentationml/2006/main">
-  <p:cSld>
-    <p:spTree>
-      <p:nvGrpSpPr>
-        <p:cNvPr id="1" name="Shape 80"/>
-        <p:cNvGrpSpPr/>
-        <p:nvPr/>
-      </p:nvGrpSpPr>
-      <p:grpSpPr>
-        <a:xfrm>
-          <a:off x="0" y="0"/>
-          <a:ext cx="0" cy="0"/>
-          <a:chOff x="0" y="0"/>
-          <a:chExt cx="0" cy="0"/>
-        </a:xfrm>
-      </p:grpSpPr>
-      <p:pic>
-        <p:nvPicPr>
-          <p:cNvPr id="6" name="Picture 5">
-            <a:extLst>
-              <a:ext uri="{FF2B5EF4-FFF2-40B4-BE49-F238E27FC236}">
-                <a16:creationId xmlns:a16="http://schemas.microsoft.com/office/drawing/2014/main" id="{6232964A-FBA8-4F56-A45A-05A103F1076E}"/>
-              </a:ext>
-            </a:extLst>
-          </p:cNvPr>
-          <p:cNvPicPr>
-            <a:picLocks noChangeAspect="1"/>
-          </p:cNvPicPr>
-          <p:nvPr/>
-        </p:nvPicPr>
-        <p:blipFill>
-          <a:blip r:embed="rId3"/>
-          <a:stretch>
-            <a:fillRect/>
-          </a:stretch>
-        </p:blipFill>
-        <p:spPr>
-          <a:xfrm>
-            <a:off x="0" y="-14177"/>
-            <a:ext cx="9144000" cy="5143501"/>
-          </a:xfrm>
-          <a:prstGeom prst="rect">
-            <a:avLst/>
-          </a:prstGeom>
-        </p:spPr>
-      </p:pic>
-      <p:sp>
-        <p:nvSpPr>
-          <p:cNvPr id="11" name="Google Shape;84;p14">
-            <a:extLst>
-              <a:ext uri="{FF2B5EF4-FFF2-40B4-BE49-F238E27FC236}">
-                <a16:creationId xmlns:a16="http://schemas.microsoft.com/office/drawing/2014/main" id="{40B07FC3-68E7-4681-9111-817FEF02ED58}"/>
-              </a:ext>
-            </a:extLst>
-          </p:cNvPr>
-          <p:cNvSpPr txBox="1">
-            <a:spLocks noGrp="1"/>
-          </p:cNvSpPr>
-          <p:nvPr>
-            <p:ph type="sldNum" idx="12"/>
-          </p:nvPr>
-        </p:nvSpPr>
-        <p:spPr>
-          <a:xfrm>
-            <a:off x="4297650" y="4832975"/>
-            <a:ext cx="548700" cy="310500"/>
-          </a:xfrm>
-          <a:prstGeom prst="rect">
-            <a:avLst/>
-          </a:prstGeom>
-        </p:spPr>
-        <p:txBody>
-          <a:bodyPr spcFirstLastPara="1" wrap="square" lIns="91425" tIns="91425" rIns="91425" bIns="91425" anchor="t" anchorCtr="0">
-            <a:noAutofit/>
-          </a:bodyPr>
-          <a:lstStyle/>
-          <a:p>
-            <a:pPr marL="0" lvl="0" indent="0" algn="ctr" rtl="0">
-              <a:spcBef>
-                <a:spcPts val="0"/>
-              </a:spcBef>
-              <a:spcAft>
-                <a:spcPts val="0"/>
-              </a:spcAft>
-              <a:buNone/>
-            </a:pPr>
-            <a:fld id="{00000000-1234-1234-1234-123412341234}" type="slidenum">
-              <a:rPr lang="en">
-                <a:solidFill>
-                  <a:schemeClr val="tx1"/>
-                </a:solidFill>
-              </a:rPr>
-              <a:t>9</a:t>
-            </a:fld>
-            <a:endParaRPr dirty="0">
-              <a:solidFill>
-                <a:schemeClr val="tx1"/>
-              </a:solidFill>
-            </a:endParaRPr>
-          </a:p>
-        </p:txBody>
-      </p:sp>
-    </p:spTree>
-    <p:extLst>
-      <p:ext uri="{BB962C8B-B14F-4D97-AF65-F5344CB8AC3E}">
-        <p14:creationId xmlns:p14="http://schemas.microsoft.com/office/powerpoint/2010/main" val="2858834675"/>
       </p:ext>
     </p:extLst>
   </p:cSld>

</xml_diff>